<commit_message>
Updating QuickStart.pptx to include a name for the bedrock container
</commit_message>
<xml_diff>
--- a/docs/QuickStart.pptx
+++ b/docs/QuickStart.pptx
@@ -229,7 +229,7 @@
           <a:p>
             <a:fld id="{651819AA-B41A-40A3-9C20-21EA90F62779}" type="datetimeFigureOut">
               <a:rPr lang="en-US" smtClean="0"/>
-              <a:t>7/17/17</a:t>
+              <a:t>7/18/17</a:t>
             </a:fld>
             <a:endParaRPr lang="en-US"/>
           </a:p>
@@ -965,7 +965,7 @@
           <a:p>
             <a:fld id="{7945E9E4-EAFC-ED42-B4C7-D719C349FAB2}" type="datetimeFigureOut">
               <a:rPr lang="en-US" smtClean="0"/>
-              <a:t>7/17/17</a:t>
+              <a:t>7/18/17</a:t>
             </a:fld>
             <a:endParaRPr lang="en-US"/>
           </a:p>
@@ -1130,7 +1130,7 @@
           <a:p>
             <a:fld id="{7945E9E4-EAFC-ED42-B4C7-D719C349FAB2}" type="datetimeFigureOut">
               <a:rPr lang="en-US" smtClean="0"/>
-              <a:t>7/17/17</a:t>
+              <a:t>7/18/17</a:t>
             </a:fld>
             <a:endParaRPr lang="en-US"/>
           </a:p>
@@ -1371,7 +1371,7 @@
           <a:p>
             <a:fld id="{7945E9E4-EAFC-ED42-B4C7-D719C349FAB2}" type="datetimeFigureOut">
               <a:rPr lang="en-US" smtClean="0"/>
-              <a:t>7/17/17</a:t>
+              <a:t>7/18/17</a:t>
             </a:fld>
             <a:endParaRPr lang="en-US"/>
           </a:p>
@@ -1598,7 +1598,7 @@
           <a:p>
             <a:fld id="{7945E9E4-EAFC-ED42-B4C7-D719C349FAB2}" type="datetimeFigureOut">
               <a:rPr lang="en-US" smtClean="0"/>
-              <a:t>7/17/17</a:t>
+              <a:t>7/18/17</a:t>
             </a:fld>
             <a:endParaRPr lang="en-US"/>
           </a:p>
@@ -1960,7 +1960,7 @@
           <a:p>
             <a:fld id="{7945E9E4-EAFC-ED42-B4C7-D719C349FAB2}" type="datetimeFigureOut">
               <a:rPr lang="en-US" smtClean="0"/>
-              <a:t>7/17/17</a:t>
+              <a:t>7/18/17</a:t>
             </a:fld>
             <a:endParaRPr lang="en-US"/>
           </a:p>
@@ -2073,7 +2073,7 @@
           <a:p>
             <a:fld id="{7945E9E4-EAFC-ED42-B4C7-D719C349FAB2}" type="datetimeFigureOut">
               <a:rPr lang="en-US" smtClean="0"/>
-              <a:t>7/17/17</a:t>
+              <a:t>7/18/17</a:t>
             </a:fld>
             <a:endParaRPr lang="en-US"/>
           </a:p>
@@ -2163,7 +2163,7 @@
           <a:p>
             <a:fld id="{7945E9E4-EAFC-ED42-B4C7-D719C349FAB2}" type="datetimeFigureOut">
               <a:rPr lang="en-US" smtClean="0"/>
-              <a:t>7/17/17</a:t>
+              <a:t>7/18/17</a:t>
             </a:fld>
             <a:endParaRPr lang="en-US"/>
           </a:p>
@@ -2435,7 +2435,7 @@
           <a:p>
             <a:fld id="{7945E9E4-EAFC-ED42-B4C7-D719C349FAB2}" type="datetimeFigureOut">
               <a:rPr lang="en-US" smtClean="0"/>
-              <a:t>7/17/17</a:t>
+              <a:t>7/18/17</a:t>
             </a:fld>
             <a:endParaRPr lang="en-US"/>
           </a:p>
@@ -2683,7 +2683,7 @@
           <a:p>
             <a:fld id="{7945E9E4-EAFC-ED42-B4C7-D719C349FAB2}" type="datetimeFigureOut">
               <a:rPr lang="en-US" smtClean="0"/>
-              <a:t>7/17/17</a:t>
+              <a:t>7/18/17</a:t>
             </a:fld>
             <a:endParaRPr lang="en-US"/>
           </a:p>
@@ -3215,7 +3215,7 @@
           <a:p>
             <a:fld id="{7945E9E4-EAFC-ED42-B4C7-D719C349FAB2}" type="datetimeFigureOut">
               <a:rPr lang="en-US" smtClean="0"/>
-              <a:t>7/17/17</a:t>
+              <a:t>7/18/17</a:t>
             </a:fld>
             <a:endParaRPr lang="en-US"/>
           </a:p>
@@ -3390,7 +3390,7 @@
           <a:p>
             <a:fld id="{7945E9E4-EAFC-ED42-B4C7-D719C349FAB2}" type="datetimeFigureOut">
               <a:rPr lang="en-US" smtClean="0"/>
-              <a:t>7/17/17</a:t>
+              <a:t>7/18/17</a:t>
             </a:fld>
             <a:endParaRPr lang="en-US"/>
           </a:p>
@@ -6206,7 +6206,7 @@
           <a:p>
             <a:fld id="{7945E9E4-EAFC-ED42-B4C7-D719C349FAB2}" type="datetimeFigureOut">
               <a:rPr lang="en-US" smtClean="0"/>
-              <a:t>7/17/17</a:t>
+              <a:t>7/18/17</a:t>
             </a:fld>
             <a:endParaRPr lang="en-US"/>
           </a:p>
@@ -6997,11 +6997,7 @@
           <a:p>
             <a:r>
               <a:rPr lang="en-US" sz="4400" dirty="0" smtClean="0"/>
-              <a:t>Checkout Bedrock from Github.com Start the Docker </a:t>
-            </a:r>
-            <a:r>
-              <a:rPr lang="en-US" sz="4400" dirty="0" smtClean="0"/>
-              <a:t>Container</a:t>
+              <a:t>Checkout Bedrock from Github.com Start the Docker Container</a:t>
             </a:r>
             <a:endParaRPr lang="en-US" sz="4400" dirty="0"/>
           </a:p>
@@ -7152,7 +7148,19 @@
             </a:r>
             <a:r>
               <a:rPr lang="en-US" dirty="0"/>
-              <a:t> run -p 81:81 -p 82:82 -d bedrock</a:t>
+              <a:t> run -p 81:81 -p </a:t>
+            </a:r>
+            <a:r>
+              <a:rPr lang="en-US"/>
+              <a:t>82:82 </a:t>
+            </a:r>
+            <a:r>
+              <a:rPr lang="en-US" smtClean="0"/>
+              <a:t>–name bedrock -d </a:t>
+            </a:r>
+            <a:r>
+              <a:rPr lang="en-US" dirty="0"/>
+              <a:t>bedrock</a:t>
             </a:r>
             <a:r>
               <a:rPr lang="en-US" dirty="0" smtClean="0"/>

</xml_diff>

<commit_message>
Updating QuickStart to reference Logit2 Opal for installation
</commit_message>
<xml_diff>
--- a/docs/QuickStart.pptx
+++ b/docs/QuickStart.pptx
@@ -7148,14 +7148,10 @@
             </a:r>
             <a:r>
               <a:rPr lang="en-US" dirty="0"/>
-              <a:t> run -p 81:81 -p </a:t>
-            </a:r>
-            <a:r>
-              <a:rPr lang="en-US"/>
-              <a:t>82:82 </a:t>
-            </a:r>
-            <a:r>
-              <a:rPr lang="en-US" smtClean="0"/>
+              <a:t> run -p 81:81 -p 82:82 </a:t>
+            </a:r>
+            <a:r>
+              <a:rPr lang="en-US" dirty="0" smtClean="0"/>
               <a:t>–name bedrock -d </a:t>
             </a:r>
             <a:r>
@@ -7259,7 +7255,23 @@
           <a:p>
             <a:r>
               <a:rPr lang="en-US" dirty="0" smtClean="0"/>
-              <a:t>Download the logit2 Opal into a local directory and run the following to install the logit2 Opal</a:t>
+              <a:t>Install the logit2 Opal into Bedrock (Needed because this is not installed by default by </a:t>
+            </a:r>
+            <a:r>
+              <a:rPr lang="en-US" dirty="0" err="1" smtClean="0"/>
+              <a:t>docker</a:t>
+            </a:r>
+            <a:r>
+              <a:rPr lang="en-US" dirty="0"/>
+              <a:t> </a:t>
+            </a:r>
+            <a:r>
+              <a:rPr lang="en-US" dirty="0" smtClean="0"/>
+              <a:t>into a vanilla Bedrock Server)</a:t>
+            </a:r>
+            <a:r>
+              <a:rPr lang="en-US" dirty="0" smtClean="0"/>
+              <a:t/>
             </a:r>
             <a:br>
               <a:rPr lang="en-US" dirty="0" smtClean="0"/>
@@ -7297,7 +7309,56 @@
                 <a:latin typeface="Consolas" panose="020B0609020204030204" pitchFamily="49" charset="0"/>
                 <a:cs typeface="Consolas" panose="020B0609020204030204" pitchFamily="49" charset="0"/>
               </a:rPr>
-              <a:t> $ID opal-analytics-logit2</a:t>
+              <a:t> </a:t>
+            </a:r>
+            <a:r>
+              <a:rPr lang="en-US" dirty="0" smtClean="0">
+                <a:latin typeface="Consolas" panose="020B0609020204030204" pitchFamily="49" charset="0"/>
+                <a:cs typeface="Consolas" panose="020B0609020204030204" pitchFamily="49" charset="0"/>
+              </a:rPr>
+              <a:t>bedrock </a:t>
+            </a:r>
+            <a:r>
+              <a:rPr lang="en-US" dirty="0" smtClean="0">
+                <a:latin typeface="Consolas" panose="020B0609020204030204" pitchFamily="49" charset="0"/>
+                <a:cs typeface="Consolas" panose="020B0609020204030204" pitchFamily="49" charset="0"/>
+              </a:rPr>
+              <a:t>https</a:t>
+            </a:r>
+            <a:r>
+              <a:rPr lang="en-US" dirty="0">
+                <a:latin typeface="Consolas" panose="020B0609020204030204" pitchFamily="49" charset="0"/>
+                <a:cs typeface="Consolas" panose="020B0609020204030204" pitchFamily="49" charset="0"/>
+              </a:rPr>
+              <a:t>://</a:t>
+            </a:r>
+            <a:r>
+              <a:rPr lang="en-US" dirty="0" err="1">
+                <a:latin typeface="Consolas" panose="020B0609020204030204" pitchFamily="49" charset="0"/>
+                <a:cs typeface="Consolas" panose="020B0609020204030204" pitchFamily="49" charset="0"/>
+              </a:rPr>
+              <a:t>github.com</a:t>
+            </a:r>
+            <a:r>
+              <a:rPr lang="en-US" dirty="0">
+                <a:latin typeface="Consolas" panose="020B0609020204030204" pitchFamily="49" charset="0"/>
+                <a:cs typeface="Consolas" panose="020B0609020204030204" pitchFamily="49" charset="0"/>
+              </a:rPr>
+              <a:t>/Bedrock-</a:t>
+            </a:r>
+            <a:r>
+              <a:rPr lang="en-US" dirty="0" err="1">
+                <a:latin typeface="Consolas" panose="020B0609020204030204" pitchFamily="49" charset="0"/>
+                <a:cs typeface="Consolas" panose="020B0609020204030204" pitchFamily="49" charset="0"/>
+              </a:rPr>
+              <a:t>py</a:t>
+            </a:r>
+            <a:r>
+              <a:rPr lang="en-US" dirty="0">
+                <a:latin typeface="Consolas" panose="020B0609020204030204" pitchFamily="49" charset="0"/>
+                <a:cs typeface="Consolas" panose="020B0609020204030204" pitchFamily="49" charset="0"/>
+              </a:rPr>
+              <a:t>/opal-analytics-logit2.git</a:t>
             </a:r>
             <a:endParaRPr lang="en-US" dirty="0"/>
           </a:p>

</xml_diff>